<commit_message>
incorporated feedback improved figure for KNN
</commit_message>
<xml_diff>
--- a/Figures.pptx
+++ b/Figures.pptx
@@ -198,7 +198,7 @@
           <a:p>
             <a:fld id="{DEFAA967-0ABF-4065-B760-47CF75B8387E}" type="datetimeFigureOut">
               <a:rPr lang="en-US" smtClean="0"/>
-              <a:t>6/15/2020</a:t>
+              <a:t>6/17/2020</a:t>
             </a:fld>
             <a:endParaRPr lang="en-US"/>
           </a:p>
@@ -696,7 +696,7 @@
           <a:p>
             <a:fld id="{827ADAB3-46CF-49B2-A95A-71DC14D6E9D6}" type="datetimeFigureOut">
               <a:rPr lang="en-US" smtClean="0"/>
-              <a:t>6/15/2020</a:t>
+              <a:t>6/17/2020</a:t>
             </a:fld>
             <a:endParaRPr lang="en-US"/>
           </a:p>
@@ -894,7 +894,7 @@
           <a:p>
             <a:fld id="{827ADAB3-46CF-49B2-A95A-71DC14D6E9D6}" type="datetimeFigureOut">
               <a:rPr lang="en-US" smtClean="0"/>
-              <a:t>6/15/2020</a:t>
+              <a:t>6/17/2020</a:t>
             </a:fld>
             <a:endParaRPr lang="en-US"/>
           </a:p>
@@ -1102,7 +1102,7 @@
           <a:p>
             <a:fld id="{827ADAB3-46CF-49B2-A95A-71DC14D6E9D6}" type="datetimeFigureOut">
               <a:rPr lang="en-US" smtClean="0"/>
-              <a:t>6/15/2020</a:t>
+              <a:t>6/17/2020</a:t>
             </a:fld>
             <a:endParaRPr lang="en-US"/>
           </a:p>
@@ -1300,7 +1300,7 @@
           <a:p>
             <a:fld id="{827ADAB3-46CF-49B2-A95A-71DC14D6E9D6}" type="datetimeFigureOut">
               <a:rPr lang="en-US" smtClean="0"/>
-              <a:t>6/15/2020</a:t>
+              <a:t>6/17/2020</a:t>
             </a:fld>
             <a:endParaRPr lang="en-US"/>
           </a:p>
@@ -1575,7 +1575,7 @@
           <a:p>
             <a:fld id="{827ADAB3-46CF-49B2-A95A-71DC14D6E9D6}" type="datetimeFigureOut">
               <a:rPr lang="en-US" smtClean="0"/>
-              <a:t>6/15/2020</a:t>
+              <a:t>6/17/2020</a:t>
             </a:fld>
             <a:endParaRPr lang="en-US"/>
           </a:p>
@@ -1840,7 +1840,7 @@
           <a:p>
             <a:fld id="{827ADAB3-46CF-49B2-A95A-71DC14D6E9D6}" type="datetimeFigureOut">
               <a:rPr lang="en-US" smtClean="0"/>
-              <a:t>6/15/2020</a:t>
+              <a:t>6/17/2020</a:t>
             </a:fld>
             <a:endParaRPr lang="en-US"/>
           </a:p>
@@ -2252,7 +2252,7 @@
           <a:p>
             <a:fld id="{827ADAB3-46CF-49B2-A95A-71DC14D6E9D6}" type="datetimeFigureOut">
               <a:rPr lang="en-US" smtClean="0"/>
-              <a:t>6/15/2020</a:t>
+              <a:t>6/17/2020</a:t>
             </a:fld>
             <a:endParaRPr lang="en-US"/>
           </a:p>
@@ -2393,7 +2393,7 @@
           <a:p>
             <a:fld id="{827ADAB3-46CF-49B2-A95A-71DC14D6E9D6}" type="datetimeFigureOut">
               <a:rPr lang="en-US" smtClean="0"/>
-              <a:t>6/15/2020</a:t>
+              <a:t>6/17/2020</a:t>
             </a:fld>
             <a:endParaRPr lang="en-US"/>
           </a:p>
@@ -2506,7 +2506,7 @@
           <a:p>
             <a:fld id="{827ADAB3-46CF-49B2-A95A-71DC14D6E9D6}" type="datetimeFigureOut">
               <a:rPr lang="en-US" smtClean="0"/>
-              <a:t>6/15/2020</a:t>
+              <a:t>6/17/2020</a:t>
             </a:fld>
             <a:endParaRPr lang="en-US"/>
           </a:p>
@@ -2817,7 +2817,7 @@
           <a:p>
             <a:fld id="{827ADAB3-46CF-49B2-A95A-71DC14D6E9D6}" type="datetimeFigureOut">
               <a:rPr lang="en-US" smtClean="0"/>
-              <a:t>6/15/2020</a:t>
+              <a:t>6/17/2020</a:t>
             </a:fld>
             <a:endParaRPr lang="en-US"/>
           </a:p>
@@ -3105,7 +3105,7 @@
           <a:p>
             <a:fld id="{827ADAB3-46CF-49B2-A95A-71DC14D6E9D6}" type="datetimeFigureOut">
               <a:rPr lang="en-US" smtClean="0"/>
-              <a:t>6/15/2020</a:t>
+              <a:t>6/17/2020</a:t>
             </a:fld>
             <a:endParaRPr lang="en-US"/>
           </a:p>
@@ -3346,7 +3346,7 @@
           <a:p>
             <a:fld id="{827ADAB3-46CF-49B2-A95A-71DC14D6E9D6}" type="datetimeFigureOut">
               <a:rPr lang="en-US" smtClean="0"/>
-              <a:t>6/15/2020</a:t>
+              <a:t>6/17/2020</a:t>
             </a:fld>
             <a:endParaRPr lang="en-US"/>
           </a:p>
@@ -7852,10 +7852,10 @@
       </p:grpSpPr>
       <p:grpSp>
         <p:nvGrpSpPr>
-          <p:cNvPr id="45" name="Group 44">
+          <p:cNvPr id="3" name="Group 2">
             <a:extLst>
               <a:ext uri="{FF2B5EF4-FFF2-40B4-BE49-F238E27FC236}">
-                <a16:creationId xmlns:a16="http://schemas.microsoft.com/office/drawing/2014/main" id="{87A4E8B3-09F8-47DC-AB37-125AD6ACBB7C}"/>
+                <a16:creationId xmlns:a16="http://schemas.microsoft.com/office/drawing/2014/main" id="{32C784F1-8E36-421E-8068-51569F9EBE5C}"/>
               </a:ext>
             </a:extLst>
           </p:cNvPr>
@@ -7864,10 +7864,10 @@
         </p:nvGrpSpPr>
         <p:grpSpPr>
           <a:xfrm>
-            <a:off x="2095722" y="1387931"/>
-            <a:ext cx="4792758" cy="2766057"/>
-            <a:chOff x="2248609" y="1318262"/>
-            <a:chExt cx="5610696" cy="3653610"/>
+            <a:off x="2095723" y="1387930"/>
+            <a:ext cx="4792757" cy="2766058"/>
+            <a:chOff x="2095723" y="1387930"/>
+            <a:chExt cx="4792757" cy="2766058"/>
           </a:xfrm>
         </p:grpSpPr>
         <p:cxnSp>
@@ -7886,8 +7886,8 @@
           </p:nvCxnSpPr>
           <p:spPr>
             <a:xfrm flipH="1">
-              <a:off x="2664622" y="1319884"/>
-              <a:ext cx="7137" cy="3273858"/>
+              <a:off x="2451088" y="1389159"/>
+              <a:ext cx="6097" cy="2478556"/>
             </a:xfrm>
             <a:prstGeom prst="line">
               <a:avLst/>
@@ -7924,8 +7924,8 @@
           </p:nvCxnSpPr>
           <p:spPr>
             <a:xfrm>
-              <a:off x="2664622" y="4593742"/>
-              <a:ext cx="5008718" cy="0"/>
+              <a:off x="2451088" y="3867715"/>
+              <a:ext cx="4278538" cy="0"/>
             </a:xfrm>
             <a:prstGeom prst="line">
               <a:avLst/>
@@ -7946,328 +7946,6 @@
             </a:fontRef>
           </p:style>
         </p:cxnSp>
-        <p:sp>
-          <p:nvSpPr>
-            <p:cNvPr id="9" name="Isosceles Triangle 8">
-              <a:extLst>
-                <a:ext uri="{FF2B5EF4-FFF2-40B4-BE49-F238E27FC236}">
-                  <a16:creationId xmlns:a16="http://schemas.microsoft.com/office/drawing/2014/main" id="{DB7F5119-B5BD-4C18-9059-869778922DC4}"/>
-                </a:ext>
-              </a:extLst>
-            </p:cNvPr>
-            <p:cNvSpPr/>
-            <p:nvPr/>
-          </p:nvSpPr>
-          <p:spPr>
-            <a:xfrm>
-              <a:off x="6514943" y="2224757"/>
-              <a:ext cx="371115" cy="452538"/>
-            </a:xfrm>
-            <a:prstGeom prst="triangle">
-              <a:avLst/>
-            </a:prstGeom>
-          </p:spPr>
-          <p:style>
-            <a:lnRef idx="2">
-              <a:schemeClr val="accent1">
-                <a:shade val="50000"/>
-              </a:schemeClr>
-            </a:lnRef>
-            <a:fillRef idx="1">
-              <a:schemeClr val="accent1"/>
-            </a:fillRef>
-            <a:effectRef idx="0">
-              <a:schemeClr val="accent1"/>
-            </a:effectRef>
-            <a:fontRef idx="minor">
-              <a:schemeClr val="lt1"/>
-            </a:fontRef>
-          </p:style>
-          <p:txBody>
-            <a:bodyPr rtlCol="0" anchor="ctr"/>
-            <a:lstStyle/>
-            <a:p>
-              <a:pPr algn="ctr"/>
-              <a:endParaRPr lang="en-US"/>
-            </a:p>
-          </p:txBody>
-        </p:sp>
-        <p:sp>
-          <p:nvSpPr>
-            <p:cNvPr id="11" name="Isosceles Triangle 10">
-              <a:extLst>
-                <a:ext uri="{FF2B5EF4-FFF2-40B4-BE49-F238E27FC236}">
-                  <a16:creationId xmlns:a16="http://schemas.microsoft.com/office/drawing/2014/main" id="{4AE3C191-C22A-44DC-ADDC-517779F0DE82}"/>
-                </a:ext>
-              </a:extLst>
-            </p:cNvPr>
-            <p:cNvSpPr/>
-            <p:nvPr/>
-          </p:nvSpPr>
-          <p:spPr>
-            <a:xfrm>
-              <a:off x="5281618" y="2550994"/>
-              <a:ext cx="371115" cy="452538"/>
-            </a:xfrm>
-            <a:prstGeom prst="triangle">
-              <a:avLst/>
-            </a:prstGeom>
-          </p:spPr>
-          <p:style>
-            <a:lnRef idx="2">
-              <a:schemeClr val="accent1">
-                <a:shade val="50000"/>
-              </a:schemeClr>
-            </a:lnRef>
-            <a:fillRef idx="1">
-              <a:schemeClr val="accent1"/>
-            </a:fillRef>
-            <a:effectRef idx="0">
-              <a:schemeClr val="accent1"/>
-            </a:effectRef>
-            <a:fontRef idx="minor">
-              <a:schemeClr val="lt1"/>
-            </a:fontRef>
-          </p:style>
-          <p:txBody>
-            <a:bodyPr rtlCol="0" anchor="ctr"/>
-            <a:lstStyle/>
-            <a:p>
-              <a:pPr algn="ctr"/>
-              <a:endParaRPr lang="en-US"/>
-            </a:p>
-          </p:txBody>
-        </p:sp>
-        <p:sp>
-          <p:nvSpPr>
-            <p:cNvPr id="12" name="Isosceles Triangle 11">
-              <a:extLst>
-                <a:ext uri="{FF2B5EF4-FFF2-40B4-BE49-F238E27FC236}">
-                  <a16:creationId xmlns:a16="http://schemas.microsoft.com/office/drawing/2014/main" id="{7D59D00F-8653-4D92-B88F-A36AC882D238}"/>
-                </a:ext>
-              </a:extLst>
-            </p:cNvPr>
-            <p:cNvSpPr/>
-            <p:nvPr/>
-          </p:nvSpPr>
-          <p:spPr>
-            <a:xfrm>
-              <a:off x="5759431" y="2035532"/>
-              <a:ext cx="371115" cy="452538"/>
-            </a:xfrm>
-            <a:prstGeom prst="triangle">
-              <a:avLst/>
-            </a:prstGeom>
-          </p:spPr>
-          <p:style>
-            <a:lnRef idx="2">
-              <a:schemeClr val="accent1">
-                <a:shade val="50000"/>
-              </a:schemeClr>
-            </a:lnRef>
-            <a:fillRef idx="1">
-              <a:schemeClr val="accent1"/>
-            </a:fillRef>
-            <a:effectRef idx="0">
-              <a:schemeClr val="accent1"/>
-            </a:effectRef>
-            <a:fontRef idx="minor">
-              <a:schemeClr val="lt1"/>
-            </a:fontRef>
-          </p:style>
-          <p:txBody>
-            <a:bodyPr rtlCol="0" anchor="ctr"/>
-            <a:lstStyle/>
-            <a:p>
-              <a:pPr algn="ctr"/>
-              <a:endParaRPr lang="en-US"/>
-            </a:p>
-          </p:txBody>
-        </p:sp>
-        <p:sp>
-          <p:nvSpPr>
-            <p:cNvPr id="13" name="Oval 12">
-              <a:extLst>
-                <a:ext uri="{FF2B5EF4-FFF2-40B4-BE49-F238E27FC236}">
-                  <a16:creationId xmlns:a16="http://schemas.microsoft.com/office/drawing/2014/main" id="{91E44E92-CB34-46C1-A070-A91CA2EA2B72}"/>
-                </a:ext>
-              </a:extLst>
-            </p:cNvPr>
-            <p:cNvSpPr/>
-            <p:nvPr/>
-          </p:nvSpPr>
-          <p:spPr>
-            <a:xfrm>
-              <a:off x="3766025" y="2839916"/>
-              <a:ext cx="449620" cy="360611"/>
-            </a:xfrm>
-            <a:prstGeom prst="ellipse">
-              <a:avLst/>
-            </a:prstGeom>
-          </p:spPr>
-          <p:style>
-            <a:lnRef idx="2">
-              <a:schemeClr val="accent6">
-                <a:shade val="50000"/>
-              </a:schemeClr>
-            </a:lnRef>
-            <a:fillRef idx="1">
-              <a:schemeClr val="accent6"/>
-            </a:fillRef>
-            <a:effectRef idx="0">
-              <a:schemeClr val="accent6"/>
-            </a:effectRef>
-            <a:fontRef idx="minor">
-              <a:schemeClr val="lt1"/>
-            </a:fontRef>
-          </p:style>
-          <p:txBody>
-            <a:bodyPr rtlCol="0" anchor="ctr"/>
-            <a:lstStyle/>
-            <a:p>
-              <a:pPr algn="ctr"/>
-              <a:endParaRPr lang="en-US"/>
-            </a:p>
-          </p:txBody>
-        </p:sp>
-        <p:sp>
-          <p:nvSpPr>
-            <p:cNvPr id="14" name="Oval 13">
-              <a:extLst>
-                <a:ext uri="{FF2B5EF4-FFF2-40B4-BE49-F238E27FC236}">
-                  <a16:creationId xmlns:a16="http://schemas.microsoft.com/office/drawing/2014/main" id="{13179CF5-BAEF-49A6-BD1E-883A4FA5CEF6}"/>
-                </a:ext>
-              </a:extLst>
-            </p:cNvPr>
-            <p:cNvSpPr/>
-            <p:nvPr/>
-          </p:nvSpPr>
-          <p:spPr>
-            <a:xfrm>
-              <a:off x="2798438" y="2638516"/>
-              <a:ext cx="449620" cy="360611"/>
-            </a:xfrm>
-            <a:prstGeom prst="ellipse">
-              <a:avLst/>
-            </a:prstGeom>
-          </p:spPr>
-          <p:style>
-            <a:lnRef idx="2">
-              <a:schemeClr val="accent6">
-                <a:shade val="50000"/>
-              </a:schemeClr>
-            </a:lnRef>
-            <a:fillRef idx="1">
-              <a:schemeClr val="accent6"/>
-            </a:fillRef>
-            <a:effectRef idx="0">
-              <a:schemeClr val="accent6"/>
-            </a:effectRef>
-            <a:fontRef idx="minor">
-              <a:schemeClr val="lt1"/>
-            </a:fontRef>
-          </p:style>
-          <p:txBody>
-            <a:bodyPr rtlCol="0" anchor="ctr"/>
-            <a:lstStyle/>
-            <a:p>
-              <a:pPr algn="ctr"/>
-              <a:endParaRPr lang="en-US"/>
-            </a:p>
-          </p:txBody>
-        </p:sp>
-        <p:sp>
-          <p:nvSpPr>
-            <p:cNvPr id="15" name="Oval 14">
-              <a:extLst>
-                <a:ext uri="{FF2B5EF4-FFF2-40B4-BE49-F238E27FC236}">
-                  <a16:creationId xmlns:a16="http://schemas.microsoft.com/office/drawing/2014/main" id="{54DBC496-D38B-4F7E-AAEC-CB4FF812C86E}"/>
-                </a:ext>
-              </a:extLst>
-            </p:cNvPr>
-            <p:cNvSpPr/>
-            <p:nvPr/>
-          </p:nvSpPr>
-          <p:spPr>
-            <a:xfrm>
-              <a:off x="3358060" y="3320871"/>
-              <a:ext cx="449620" cy="360611"/>
-            </a:xfrm>
-            <a:prstGeom prst="ellipse">
-              <a:avLst/>
-            </a:prstGeom>
-          </p:spPr>
-          <p:style>
-            <a:lnRef idx="2">
-              <a:schemeClr val="accent6">
-                <a:shade val="50000"/>
-              </a:schemeClr>
-            </a:lnRef>
-            <a:fillRef idx="1">
-              <a:schemeClr val="accent6"/>
-            </a:fillRef>
-            <a:effectRef idx="0">
-              <a:schemeClr val="accent6"/>
-            </a:effectRef>
-            <a:fontRef idx="minor">
-              <a:schemeClr val="lt1"/>
-            </a:fontRef>
-          </p:style>
-          <p:txBody>
-            <a:bodyPr rtlCol="0" anchor="ctr"/>
-            <a:lstStyle/>
-            <a:p>
-              <a:pPr algn="ctr"/>
-              <a:endParaRPr lang="en-US"/>
-            </a:p>
-          </p:txBody>
-        </p:sp>
-        <p:sp>
-          <p:nvSpPr>
-            <p:cNvPr id="16" name="Oval 15">
-              <a:extLst>
-                <a:ext uri="{FF2B5EF4-FFF2-40B4-BE49-F238E27FC236}">
-                  <a16:creationId xmlns:a16="http://schemas.microsoft.com/office/drawing/2014/main" id="{EA46D5E7-9EF4-4A27-A362-F46899673BEE}"/>
-                </a:ext>
-              </a:extLst>
-            </p:cNvPr>
-            <p:cNvSpPr/>
-            <p:nvPr/>
-          </p:nvSpPr>
-          <p:spPr>
-            <a:xfrm>
-              <a:off x="2871590" y="3985594"/>
-              <a:ext cx="449620" cy="360611"/>
-            </a:xfrm>
-            <a:prstGeom prst="ellipse">
-              <a:avLst/>
-            </a:prstGeom>
-          </p:spPr>
-          <p:style>
-            <a:lnRef idx="2">
-              <a:schemeClr val="accent6">
-                <a:shade val="50000"/>
-              </a:schemeClr>
-            </a:lnRef>
-            <a:fillRef idx="1">
-              <a:schemeClr val="accent6"/>
-            </a:fillRef>
-            <a:effectRef idx="0">
-              <a:schemeClr val="accent6"/>
-            </a:effectRef>
-            <a:fontRef idx="minor">
-              <a:schemeClr val="lt1"/>
-            </a:fontRef>
-          </p:style>
-          <p:txBody>
-            <a:bodyPr rtlCol="0" anchor="ctr"/>
-            <a:lstStyle/>
-            <a:p>
-              <a:pPr algn="ctr"/>
-              <a:endParaRPr lang="en-US"/>
-            </a:p>
-          </p:txBody>
-        </p:sp>
         <p:pic>
           <p:nvPicPr>
             <p:cNvPr id="18" name="Graphic 17" descr="Help">
@@ -8299,8 +7977,8 @@
           </p:blipFill>
           <p:spPr>
             <a:xfrm>
-              <a:off x="4920603" y="2435898"/>
-              <a:ext cx="456755" cy="452538"/>
+              <a:off x="4378188" y="2234065"/>
+              <a:ext cx="390168" cy="342605"/>
             </a:xfrm>
             <a:prstGeom prst="rect">
               <a:avLst/>
@@ -8321,8 +7999,8 @@
           </p:nvSpPr>
           <p:spPr>
             <a:xfrm>
-              <a:off x="6574667" y="4629151"/>
-              <a:ext cx="1007233" cy="342721"/>
+              <a:off x="5791119" y="3894522"/>
+              <a:ext cx="860397" cy="259466"/>
             </a:xfrm>
             <a:prstGeom prst="rect">
               <a:avLst/>
@@ -8356,8 +8034,8 @@
           </p:nvSpPr>
           <p:spPr>
             <a:xfrm rot="16200000">
-              <a:off x="1679704" y="1887167"/>
-              <a:ext cx="1570174" cy="432363"/>
+              <a:off x="1686019" y="1797634"/>
+              <a:ext cx="1188740" cy="369332"/>
             </a:xfrm>
             <a:prstGeom prst="rect">
               <a:avLst/>
@@ -8391,8 +8069,8 @@
           </p:nvSpPr>
           <p:spPr>
             <a:xfrm>
-              <a:off x="4596302" y="2224758"/>
-              <a:ext cx="1173230" cy="975771"/>
+              <a:off x="4101164" y="2074217"/>
+              <a:ext cx="1002194" cy="738732"/>
             </a:xfrm>
             <a:prstGeom prst="ellipse">
               <a:avLst/>
@@ -8452,8 +8130,8 @@
           </p:nvSpPr>
           <p:spPr>
             <a:xfrm>
-              <a:off x="4146682" y="1641780"/>
-              <a:ext cx="2016648" cy="1993737"/>
+              <a:off x="3717090" y="1632858"/>
+              <a:ext cx="1722657" cy="1509409"/>
             </a:xfrm>
             <a:prstGeom prst="ellipse">
               <a:avLst/>
@@ -8497,10 +8175,10 @@
         </p:sp>
         <p:sp>
           <p:nvSpPr>
-            <p:cNvPr id="37" name="Isosceles Triangle 36">
-              <a:extLst>
-                <a:ext uri="{FF2B5EF4-FFF2-40B4-BE49-F238E27FC236}">
-                  <a16:creationId xmlns:a16="http://schemas.microsoft.com/office/drawing/2014/main" id="{C4EAE8B9-EB91-455F-8CFA-40125BC67631}"/>
+            <p:cNvPr id="38" name="Rectangle: Single Corner Rounded 37">
+              <a:extLst>
+                <a:ext uri="{FF2B5EF4-FFF2-40B4-BE49-F238E27FC236}">
+                  <a16:creationId xmlns:a16="http://schemas.microsoft.com/office/drawing/2014/main" id="{D12019E1-B744-46CD-A54F-7F65801D7570}"/>
                 </a:ext>
               </a:extLst>
             </p:cNvPr>
@@ -8509,10 +8187,134 @@
           </p:nvSpPr>
           <p:spPr>
             <a:xfrm>
-              <a:off x="5923042" y="3596694"/>
-              <a:ext cx="345915" cy="360612"/>
-            </a:xfrm>
-            <a:prstGeom prst="triangle">
+              <a:off x="5145703" y="2985918"/>
+              <a:ext cx="1533500" cy="868394"/>
+            </a:xfrm>
+            <a:prstGeom prst="round1Rect">
+              <a:avLst/>
+            </a:prstGeom>
+            <a:noFill/>
+            <a:ln w="9525" cap="flat" cmpd="sng" algn="ctr">
+              <a:solidFill>
+                <a:schemeClr val="dk1"/>
+              </a:solidFill>
+              <a:prstDash val="solid"/>
+              <a:round/>
+              <a:headEnd type="none" w="med" len="med"/>
+              <a:tailEnd type="none" w="med" len="med"/>
+            </a:ln>
+          </p:spPr>
+          <p:style>
+            <a:lnRef idx="0">
+              <a:scrgbClr r="0" g="0" b="0"/>
+            </a:lnRef>
+            <a:fillRef idx="0">
+              <a:scrgbClr r="0" g="0" b="0"/>
+            </a:fillRef>
+            <a:effectRef idx="0">
+              <a:scrgbClr r="0" g="0" b="0"/>
+            </a:effectRef>
+            <a:fontRef idx="minor">
+              <a:schemeClr val="dk1"/>
+            </a:fontRef>
+          </p:style>
+          <p:txBody>
+            <a:bodyPr rtlCol="0" anchor="ctr"/>
+            <a:lstStyle/>
+            <a:p>
+              <a:pPr algn="ctr"/>
+              <a:endParaRPr lang="en-US"/>
+            </a:p>
+          </p:txBody>
+        </p:sp>
+        <p:sp>
+          <p:nvSpPr>
+            <p:cNvPr id="40" name="TextBox 39">
+              <a:extLst>
+                <a:ext uri="{FF2B5EF4-FFF2-40B4-BE49-F238E27FC236}">
+                  <a16:creationId xmlns:a16="http://schemas.microsoft.com/office/drawing/2014/main" id="{9C5310E6-F01A-47F1-A3F8-768C0A79AD1B}"/>
+                </a:ext>
+              </a:extLst>
+            </p:cNvPr>
+            <p:cNvSpPr txBox="1"/>
+            <p:nvPr/>
+          </p:nvSpPr>
+          <p:spPr>
+            <a:xfrm>
+              <a:off x="5479907" y="3113666"/>
+              <a:ext cx="1364547" cy="285320"/>
+            </a:xfrm>
+            <a:prstGeom prst="rect">
+              <a:avLst/>
+            </a:prstGeom>
+            <a:noFill/>
+          </p:spPr>
+          <p:txBody>
+            <a:bodyPr wrap="square" rtlCol="0">
+              <a:spAutoFit/>
+            </a:bodyPr>
+            <a:lstStyle/>
+            <a:p>
+              <a:r>
+                <a:rPr lang="en-US" sz="1400" dirty="0"/>
+                <a:t>= Feasible</a:t>
+              </a:r>
+            </a:p>
+          </p:txBody>
+        </p:sp>
+        <p:sp>
+          <p:nvSpPr>
+            <p:cNvPr id="43" name="TextBox 42">
+              <a:extLst>
+                <a:ext uri="{FF2B5EF4-FFF2-40B4-BE49-F238E27FC236}">
+                  <a16:creationId xmlns:a16="http://schemas.microsoft.com/office/drawing/2014/main" id="{EBC449F2-0243-41F7-842F-7F6364176726}"/>
+                </a:ext>
+              </a:extLst>
+            </p:cNvPr>
+            <p:cNvSpPr txBox="1"/>
+            <p:nvPr/>
+          </p:nvSpPr>
+          <p:spPr>
+            <a:xfrm>
+              <a:off x="5529977" y="3454275"/>
+              <a:ext cx="1358503" cy="285320"/>
+            </a:xfrm>
+            <a:prstGeom prst="rect">
+              <a:avLst/>
+            </a:prstGeom>
+            <a:noFill/>
+          </p:spPr>
+          <p:txBody>
+            <a:bodyPr wrap="square" rtlCol="0">
+              <a:spAutoFit/>
+            </a:bodyPr>
+            <a:lstStyle/>
+            <a:p>
+              <a:r>
+                <a:rPr lang="en-US" sz="1400" dirty="0"/>
+                <a:t>= Not Feasible</a:t>
+              </a:r>
+            </a:p>
+          </p:txBody>
+        </p:sp>
+        <p:sp>
+          <p:nvSpPr>
+            <p:cNvPr id="24" name="Oval 23">
+              <a:extLst>
+                <a:ext uri="{FF2B5EF4-FFF2-40B4-BE49-F238E27FC236}">
+                  <a16:creationId xmlns:a16="http://schemas.microsoft.com/office/drawing/2014/main" id="{74D23144-5ED4-4A5F-857C-AFCA04E1EB53}"/>
+                </a:ext>
+              </a:extLst>
+            </p:cNvPr>
+            <p:cNvSpPr/>
+            <p:nvPr/>
+          </p:nvSpPr>
+          <p:spPr>
+            <a:xfrm>
+              <a:off x="4778112" y="2303613"/>
+              <a:ext cx="315489" cy="294427"/>
+            </a:xfrm>
+            <a:prstGeom prst="ellipse">
               <a:avLst/>
             </a:prstGeom>
           </p:spPr>
@@ -8543,10 +8345,10 @@
         </p:sp>
         <p:sp>
           <p:nvSpPr>
-            <p:cNvPr id="38" name="Rectangle: Single Corner Rounded 37">
-              <a:extLst>
-                <a:ext uri="{FF2B5EF4-FFF2-40B4-BE49-F238E27FC236}">
-                  <a16:creationId xmlns:a16="http://schemas.microsoft.com/office/drawing/2014/main" id="{D12019E1-B744-46CD-A54F-7F65801D7570}"/>
+            <p:cNvPr id="25" name="Oval 24">
+              <a:extLst>
+                <a:ext uri="{FF2B5EF4-FFF2-40B4-BE49-F238E27FC236}">
+                  <a16:creationId xmlns:a16="http://schemas.microsoft.com/office/drawing/2014/main" id="{BDCAC600-3FCF-4777-9D48-26AE32995944}"/>
                 </a:ext>
               </a:extLst>
             </p:cNvPr>
@@ -8555,35 +8357,73 @@
           </p:nvSpPr>
           <p:spPr>
             <a:xfrm>
-              <a:off x="5819103" y="3429000"/>
-              <a:ext cx="1795209" cy="1147038"/>
-            </a:xfrm>
-            <a:prstGeom prst="round1Rect">
-              <a:avLst/>
-            </a:prstGeom>
-            <a:noFill/>
-            <a:ln w="9525" cap="flat" cmpd="sng" algn="ctr">
-              <a:solidFill>
-                <a:schemeClr val="dk1"/>
-              </a:solidFill>
-              <a:prstDash val="solid"/>
-              <a:round/>
-              <a:headEnd type="none" w="med" len="med"/>
-              <a:tailEnd type="none" w="med" len="med"/>
-            </a:ln>
+              <a:off x="5049236" y="2026359"/>
+              <a:ext cx="315489" cy="294427"/>
+            </a:xfrm>
+            <a:prstGeom prst="ellipse">
+              <a:avLst/>
+            </a:prstGeom>
           </p:spPr>
           <p:style>
-            <a:lnRef idx="0">
-              <a:scrgbClr r="0" g="0" b="0"/>
+            <a:lnRef idx="2">
+              <a:schemeClr val="accent1">
+                <a:shade val="50000"/>
+              </a:schemeClr>
             </a:lnRef>
-            <a:fillRef idx="0">
-              <a:scrgbClr r="0" g="0" b="0"/>
+            <a:fillRef idx="1">
+              <a:schemeClr val="accent1"/>
             </a:fillRef>
             <a:effectRef idx="0">
-              <a:scrgbClr r="0" g="0" b="0"/>
+              <a:schemeClr val="accent1"/>
             </a:effectRef>
             <a:fontRef idx="minor">
-              <a:schemeClr val="dk1"/>
+              <a:schemeClr val="lt1"/>
+            </a:fontRef>
+          </p:style>
+          <p:txBody>
+            <a:bodyPr rtlCol="0" anchor="ctr"/>
+            <a:lstStyle/>
+            <a:p>
+              <a:pPr algn="ctr"/>
+              <a:endParaRPr lang="en-US" dirty="0"/>
+            </a:p>
+          </p:txBody>
+        </p:sp>
+        <p:sp>
+          <p:nvSpPr>
+            <p:cNvPr id="26" name="Oval 25">
+              <a:extLst>
+                <a:ext uri="{FF2B5EF4-FFF2-40B4-BE49-F238E27FC236}">
+                  <a16:creationId xmlns:a16="http://schemas.microsoft.com/office/drawing/2014/main" id="{9FB9403B-6D91-416C-8485-5DD9C079C8A6}"/>
+                </a:ext>
+              </a:extLst>
+            </p:cNvPr>
+            <p:cNvSpPr/>
+            <p:nvPr/>
+          </p:nvSpPr>
+          <p:spPr>
+            <a:xfrm>
+              <a:off x="5710871" y="2076467"/>
+              <a:ext cx="300776" cy="273011"/>
+            </a:xfrm>
+            <a:prstGeom prst="ellipse">
+              <a:avLst/>
+            </a:prstGeom>
+          </p:spPr>
+          <p:style>
+            <a:lnRef idx="2">
+              <a:schemeClr val="accent1">
+                <a:shade val="50000"/>
+              </a:schemeClr>
+            </a:lnRef>
+            <a:fillRef idx="1">
+              <a:schemeClr val="accent1"/>
+            </a:fillRef>
+            <a:effectRef idx="0">
+              <a:schemeClr val="accent1"/>
+            </a:effectRef>
+            <a:fontRef idx="minor">
+              <a:schemeClr val="lt1"/>
             </a:fontRef>
           </p:style>
           <p:txBody>
@@ -8597,45 +8437,56 @@
         </p:sp>
         <p:sp>
           <p:nvSpPr>
-            <p:cNvPr id="40" name="TextBox 39">
-              <a:extLst>
-                <a:ext uri="{FF2B5EF4-FFF2-40B4-BE49-F238E27FC236}">
-                  <a16:creationId xmlns:a16="http://schemas.microsoft.com/office/drawing/2014/main" id="{9C5310E6-F01A-47F1-A3F8-768C0A79AD1B}"/>
-                </a:ext>
-              </a:extLst>
-            </p:cNvPr>
-            <p:cNvSpPr txBox="1"/>
+            <p:cNvPr id="28" name="Oval 27">
+              <a:extLst>
+                <a:ext uri="{FF2B5EF4-FFF2-40B4-BE49-F238E27FC236}">
+                  <a16:creationId xmlns:a16="http://schemas.microsoft.com/office/drawing/2014/main" id="{BF2AC757-289C-4648-AE74-5BE370928D67}"/>
+                </a:ext>
+              </a:extLst>
+            </p:cNvPr>
+            <p:cNvSpPr/>
             <p:nvPr/>
           </p:nvSpPr>
           <p:spPr>
             <a:xfrm>
-              <a:off x="6210343" y="3597739"/>
-              <a:ext cx="1597422" cy="376871"/>
-            </a:xfrm>
-            <a:prstGeom prst="rect">
-              <a:avLst/>
-            </a:prstGeom>
-            <a:noFill/>
-          </p:spPr>
+              <a:off x="5214337" y="3142267"/>
+              <a:ext cx="300776" cy="273011"/>
+            </a:xfrm>
+            <a:prstGeom prst="ellipse">
+              <a:avLst/>
+            </a:prstGeom>
+          </p:spPr>
+          <p:style>
+            <a:lnRef idx="2">
+              <a:schemeClr val="accent1">
+                <a:shade val="50000"/>
+              </a:schemeClr>
+            </a:lnRef>
+            <a:fillRef idx="1">
+              <a:schemeClr val="accent1"/>
+            </a:fillRef>
+            <a:effectRef idx="0">
+              <a:schemeClr val="accent1"/>
+            </a:effectRef>
+            <a:fontRef idx="minor">
+              <a:schemeClr val="lt1"/>
+            </a:fontRef>
+          </p:style>
           <p:txBody>
-            <a:bodyPr wrap="square" rtlCol="0">
-              <a:spAutoFit/>
-            </a:bodyPr>
+            <a:bodyPr rtlCol="0" anchor="ctr"/>
             <a:lstStyle/>
             <a:p>
-              <a:r>
-                <a:rPr lang="en-US" sz="1400" dirty="0"/>
-                <a:t>= Feasible</a:t>
-              </a:r>
+              <a:pPr algn="ctr"/>
+              <a:endParaRPr lang="en-US"/>
             </a:p>
           </p:txBody>
         </p:sp>
         <p:sp>
           <p:nvSpPr>
-            <p:cNvPr id="41" name="Oval 40">
-              <a:extLst>
-                <a:ext uri="{FF2B5EF4-FFF2-40B4-BE49-F238E27FC236}">
-                  <a16:creationId xmlns:a16="http://schemas.microsoft.com/office/drawing/2014/main" id="{14B75359-2B39-4E44-B832-8F56390F44A3}"/>
+            <p:cNvPr id="29" name="Oval 28">
+              <a:extLst>
+                <a:ext uri="{FF2B5EF4-FFF2-40B4-BE49-F238E27FC236}">
+                  <a16:creationId xmlns:a16="http://schemas.microsoft.com/office/drawing/2014/main" id="{CFE4DBBA-D7B9-4A55-A6C6-A9EA43ADBA86}"/>
                 </a:ext>
               </a:extLst>
             </p:cNvPr>
@@ -8644,8 +8495,8 @@
           </p:nvSpPr>
           <p:spPr>
             <a:xfrm>
-              <a:off x="5871189" y="4125000"/>
-              <a:ext cx="449620" cy="360611"/>
+              <a:off x="5206980" y="3512855"/>
+              <a:ext cx="300776" cy="273011"/>
             </a:xfrm>
             <a:prstGeom prst="ellipse">
               <a:avLst/>
@@ -8678,36 +8529,185 @@
         </p:sp>
         <p:sp>
           <p:nvSpPr>
-            <p:cNvPr id="43" name="TextBox 42">
-              <a:extLst>
-                <a:ext uri="{FF2B5EF4-FFF2-40B4-BE49-F238E27FC236}">
-                  <a16:creationId xmlns:a16="http://schemas.microsoft.com/office/drawing/2014/main" id="{EBC449F2-0243-41F7-842F-7F6364176726}"/>
-                </a:ext>
-              </a:extLst>
-            </p:cNvPr>
-            <p:cNvSpPr txBox="1"/>
+            <p:cNvPr id="34" name="Oval 33">
+              <a:extLst>
+                <a:ext uri="{FF2B5EF4-FFF2-40B4-BE49-F238E27FC236}">
+                  <a16:creationId xmlns:a16="http://schemas.microsoft.com/office/drawing/2014/main" id="{AF10640C-791D-4814-8D08-10684F8B0742}"/>
+                </a:ext>
+              </a:extLst>
+            </p:cNvPr>
+            <p:cNvSpPr/>
             <p:nvPr/>
           </p:nvSpPr>
           <p:spPr>
             <a:xfrm>
-              <a:off x="6268958" y="4047640"/>
-              <a:ext cx="1590347" cy="376871"/>
-            </a:xfrm>
-            <a:prstGeom prst="rect">
-              <a:avLst/>
-            </a:prstGeom>
-            <a:noFill/>
-          </p:spPr>
+              <a:off x="3416314" y="2598040"/>
+              <a:ext cx="300776" cy="273011"/>
+            </a:xfrm>
+            <a:prstGeom prst="ellipse">
+              <a:avLst/>
+            </a:prstGeom>
+          </p:spPr>
+          <p:style>
+            <a:lnRef idx="2">
+              <a:schemeClr val="accent6">
+                <a:shade val="50000"/>
+              </a:schemeClr>
+            </a:lnRef>
+            <a:fillRef idx="1">
+              <a:schemeClr val="accent6"/>
+            </a:fillRef>
+            <a:effectRef idx="0">
+              <a:schemeClr val="accent6"/>
+            </a:effectRef>
+            <a:fontRef idx="minor">
+              <a:schemeClr val="lt1"/>
+            </a:fontRef>
+          </p:style>
           <p:txBody>
-            <a:bodyPr wrap="square" rtlCol="0">
-              <a:spAutoFit/>
-            </a:bodyPr>
+            <a:bodyPr rtlCol="0" anchor="ctr"/>
             <a:lstStyle/>
             <a:p>
-              <a:r>
-                <a:rPr lang="en-US" sz="1400" dirty="0"/>
-                <a:t>= Not Feasible</a:t>
-              </a:r>
+              <a:pPr algn="ctr"/>
+              <a:endParaRPr lang="en-US"/>
+            </a:p>
+          </p:txBody>
+        </p:sp>
+        <p:sp>
+          <p:nvSpPr>
+            <p:cNvPr id="35" name="Oval 34">
+              <a:extLst>
+                <a:ext uri="{FF2B5EF4-FFF2-40B4-BE49-F238E27FC236}">
+                  <a16:creationId xmlns:a16="http://schemas.microsoft.com/office/drawing/2014/main" id="{E6C46457-A773-42AF-A2F7-39A90383AF18}"/>
+                </a:ext>
+              </a:extLst>
+            </p:cNvPr>
+            <p:cNvSpPr/>
+            <p:nvPr/>
+          </p:nvSpPr>
+          <p:spPr>
+            <a:xfrm>
+              <a:off x="3145190" y="2977160"/>
+              <a:ext cx="300776" cy="273011"/>
+            </a:xfrm>
+            <a:prstGeom prst="ellipse">
+              <a:avLst/>
+            </a:prstGeom>
+          </p:spPr>
+          <p:style>
+            <a:lnRef idx="2">
+              <a:schemeClr val="accent6">
+                <a:shade val="50000"/>
+              </a:schemeClr>
+            </a:lnRef>
+            <a:fillRef idx="1">
+              <a:schemeClr val="accent6"/>
+            </a:fillRef>
+            <a:effectRef idx="0">
+              <a:schemeClr val="accent6"/>
+            </a:effectRef>
+            <a:fontRef idx="minor">
+              <a:schemeClr val="lt1"/>
+            </a:fontRef>
+          </p:style>
+          <p:txBody>
+            <a:bodyPr rtlCol="0" anchor="ctr"/>
+            <a:lstStyle/>
+            <a:p>
+              <a:pPr algn="ctr"/>
+              <a:endParaRPr lang="en-US"/>
+            </a:p>
+          </p:txBody>
+        </p:sp>
+        <p:sp>
+          <p:nvSpPr>
+            <p:cNvPr id="36" name="Oval 35">
+              <a:extLst>
+                <a:ext uri="{FF2B5EF4-FFF2-40B4-BE49-F238E27FC236}">
+                  <a16:creationId xmlns:a16="http://schemas.microsoft.com/office/drawing/2014/main" id="{7D4FD33F-1CF4-408E-9174-69591E1BB496}"/>
+                </a:ext>
+              </a:extLst>
+            </p:cNvPr>
+            <p:cNvSpPr/>
+            <p:nvPr/>
+          </p:nvSpPr>
+          <p:spPr>
+            <a:xfrm>
+              <a:off x="2717362" y="3317769"/>
+              <a:ext cx="300776" cy="273011"/>
+            </a:xfrm>
+            <a:prstGeom prst="ellipse">
+              <a:avLst/>
+            </a:prstGeom>
+          </p:spPr>
+          <p:style>
+            <a:lnRef idx="2">
+              <a:schemeClr val="accent6">
+                <a:shade val="50000"/>
+              </a:schemeClr>
+            </a:lnRef>
+            <a:fillRef idx="1">
+              <a:schemeClr val="accent6"/>
+            </a:fillRef>
+            <a:effectRef idx="0">
+              <a:schemeClr val="accent6"/>
+            </a:effectRef>
+            <a:fontRef idx="minor">
+              <a:schemeClr val="lt1"/>
+            </a:fontRef>
+          </p:style>
+          <p:txBody>
+            <a:bodyPr rtlCol="0" anchor="ctr"/>
+            <a:lstStyle/>
+            <a:p>
+              <a:pPr algn="ctr"/>
+              <a:endParaRPr lang="en-US"/>
+            </a:p>
+          </p:txBody>
+        </p:sp>
+        <p:sp>
+          <p:nvSpPr>
+            <p:cNvPr id="39" name="Oval 38">
+              <a:extLst>
+                <a:ext uri="{FF2B5EF4-FFF2-40B4-BE49-F238E27FC236}">
+                  <a16:creationId xmlns:a16="http://schemas.microsoft.com/office/drawing/2014/main" id="{FAF4D9D7-2A8B-47F3-8159-5633ED6A5F8A}"/>
+                </a:ext>
+              </a:extLst>
+            </p:cNvPr>
+            <p:cNvSpPr/>
+            <p:nvPr/>
+          </p:nvSpPr>
+          <p:spPr>
+            <a:xfrm>
+              <a:off x="2733525" y="2491931"/>
+              <a:ext cx="300776" cy="273011"/>
+            </a:xfrm>
+            <a:prstGeom prst="ellipse">
+              <a:avLst/>
+            </a:prstGeom>
+          </p:spPr>
+          <p:style>
+            <a:lnRef idx="2">
+              <a:schemeClr val="accent6">
+                <a:shade val="50000"/>
+              </a:schemeClr>
+            </a:lnRef>
+            <a:fillRef idx="1">
+              <a:schemeClr val="accent6"/>
+            </a:fillRef>
+            <a:effectRef idx="0">
+              <a:schemeClr val="accent6"/>
+            </a:effectRef>
+            <a:fontRef idx="minor">
+              <a:schemeClr val="lt1"/>
+            </a:fontRef>
+          </p:style>
+          <p:txBody>
+            <a:bodyPr rtlCol="0" anchor="ctr"/>
+            <a:lstStyle/>
+            <a:p>
+              <a:pPr algn="ctr"/>
+              <a:endParaRPr lang="en-US"/>
             </a:p>
           </p:txBody>
         </p:sp>

</xml_diff>